<commit_message>
Commit at version 1.1
</commit_message>
<xml_diff>
--- a/src/main/resources/01 Generics and more.pptx
+++ b/src/main/resources/01 Generics and more.pptx
@@ -9,6 +9,7 @@
     <p:sldId id="257" r:id="rId3"/>
     <p:sldId id="258" r:id="rId4"/>
     <p:sldId id="259" r:id="rId5"/>
+    <p:sldId id="260" r:id="rId6"/>
   </p:sldIdLst>
   <p:sldSz cx="9144000" cy="6858000" type="screen4x3"/>
   <p:notesSz cx="6858000" cy="9144000"/>
@@ -695,7 +696,12 @@
             <p:ph type="title"/>
           </p:nvPr>
         </p:nvSpPr>
-        <p:spPr/>
+        <p:spPr>
+          <a:xfrm>
+            <a:off x="628650" y="194644"/>
+            <a:ext cx="7886700" cy="1325563"/>
+          </a:xfrm>
+        </p:spPr>
         <p:txBody>
           <a:bodyPr/>
           <a:lstStyle/>
@@ -718,43 +724,96 @@
             <p:ph idx="1"/>
           </p:nvPr>
         </p:nvSpPr>
-        <p:spPr/>
+        <p:spPr>
+          <a:xfrm>
+            <a:off x="628650" y="1642820"/>
+            <a:ext cx="7886700" cy="4534143"/>
+          </a:xfrm>
+        </p:spPr>
         <p:txBody>
           <a:bodyPr/>
           <a:lstStyle/>
           <a:p>
             <a:pPr lvl="0"/>
             <a:r>
-              <a:rPr lang="da-DK" smtClean="0"/>
-              <a:t>Click to edit Master text styles</a:t>
-            </a:r>
+              <a:rPr lang="da-DK" dirty="0" err="1" smtClean="0"/>
+              <a:t>Click</a:t>
+            </a:r>
+            <a:r>
+              <a:rPr lang="da-DK" dirty="0" smtClean="0"/>
+              <a:t> to </a:t>
+            </a:r>
+            <a:r>
+              <a:rPr lang="da-DK" dirty="0" err="1" smtClean="0"/>
+              <a:t>edit</a:t>
+            </a:r>
+            <a:r>
+              <a:rPr lang="da-DK" dirty="0" smtClean="0"/>
+              <a:t> Master </a:t>
+            </a:r>
+            <a:r>
+              <a:rPr lang="da-DK" dirty="0" err="1" smtClean="0"/>
+              <a:t>text</a:t>
+            </a:r>
+            <a:r>
+              <a:rPr lang="da-DK" dirty="0" smtClean="0"/>
+              <a:t> </a:t>
+            </a:r>
+            <a:r>
+              <a:rPr lang="da-DK" dirty="0" err="1" smtClean="0"/>
+              <a:t>styles</a:t>
+            </a:r>
+            <a:endParaRPr lang="da-DK" dirty="0" smtClean="0"/>
           </a:p>
           <a:p>
             <a:pPr lvl="1"/>
             <a:r>
-              <a:rPr lang="da-DK" smtClean="0"/>
-              <a:t>Second level</a:t>
-            </a:r>
+              <a:rPr lang="da-DK" dirty="0" smtClean="0"/>
+              <a:t>Second </a:t>
+            </a:r>
+            <a:r>
+              <a:rPr lang="da-DK" dirty="0" err="1" smtClean="0"/>
+              <a:t>level</a:t>
+            </a:r>
+            <a:endParaRPr lang="da-DK" dirty="0" smtClean="0"/>
           </a:p>
           <a:p>
             <a:pPr lvl="2"/>
             <a:r>
-              <a:rPr lang="da-DK" smtClean="0"/>
-              <a:t>Third level</a:t>
-            </a:r>
+              <a:rPr lang="da-DK" dirty="0" smtClean="0"/>
+              <a:t>Third </a:t>
+            </a:r>
+            <a:r>
+              <a:rPr lang="da-DK" dirty="0" err="1" smtClean="0"/>
+              <a:t>level</a:t>
+            </a:r>
+            <a:endParaRPr lang="da-DK" dirty="0" smtClean="0"/>
           </a:p>
           <a:p>
             <a:pPr lvl="3"/>
             <a:r>
-              <a:rPr lang="da-DK" smtClean="0"/>
-              <a:t>Fourth level</a:t>
-            </a:r>
+              <a:rPr lang="da-DK" dirty="0" err="1" smtClean="0"/>
+              <a:t>Fourth</a:t>
+            </a:r>
+            <a:r>
+              <a:rPr lang="da-DK" dirty="0" smtClean="0"/>
+              <a:t> </a:t>
+            </a:r>
+            <a:r>
+              <a:rPr lang="da-DK" dirty="0" err="1" smtClean="0"/>
+              <a:t>level</a:t>
+            </a:r>
+            <a:endParaRPr lang="da-DK" dirty="0" smtClean="0"/>
           </a:p>
           <a:p>
             <a:pPr lvl="4"/>
             <a:r>
-              <a:rPr lang="da-DK" smtClean="0"/>
-              <a:t>Fifth level</a:t>
+              <a:rPr lang="da-DK" dirty="0" smtClean="0"/>
+              <a:t>Fifth </a:t>
+            </a:r>
+            <a:r>
+              <a:rPr lang="da-DK" dirty="0" err="1" smtClean="0"/>
+              <a:t>level</a:t>
             </a:r>
             <a:endParaRPr lang="en-US" dirty="0"/>
           </a:p>
@@ -1708,7 +1767,12 @@
             <p:ph type="title"/>
           </p:nvPr>
         </p:nvSpPr>
-        <p:spPr/>
+        <p:spPr>
+          <a:xfrm>
+            <a:off x="628650" y="163648"/>
+            <a:ext cx="7886700" cy="1325563"/>
+          </a:xfrm>
+        </p:spPr>
         <p:txBody>
           <a:bodyPr/>
           <a:lstStyle/>
@@ -3287,6 +3351,191 @@
 </p:sld>
 </file>
 
+<file path=ppt/slides/slide5.xml><?xml version="1.0" encoding="utf-8"?>
+<p:sld xmlns:a="http://schemas.openxmlformats.org/drawingml/2006/main" xmlns:r="http://schemas.openxmlformats.org/officeDocument/2006/relationships" xmlns:p="http://schemas.openxmlformats.org/presentationml/2006/main">
+  <p:cSld>
+    <p:spTree>
+      <p:nvGrpSpPr>
+        <p:cNvPr id="1" name=""/>
+        <p:cNvGrpSpPr/>
+        <p:nvPr/>
+      </p:nvGrpSpPr>
+      <p:grpSpPr>
+        <a:xfrm>
+          <a:off x="0" y="0"/>
+          <a:ext cx="0" cy="0"/>
+          <a:chOff x="0" y="0"/>
+          <a:chExt cx="0" cy="0"/>
+        </a:xfrm>
+      </p:grpSpPr>
+      <p:sp>
+        <p:nvSpPr>
+          <p:cNvPr id="2" name="Title 1"/>
+          <p:cNvSpPr>
+            <a:spLocks noGrp="1"/>
+          </p:cNvSpPr>
+          <p:nvPr>
+            <p:ph type="title"/>
+          </p:nvPr>
+        </p:nvSpPr>
+        <p:spPr/>
+        <p:txBody>
+          <a:bodyPr/>
+          <a:lstStyle/>
+          <a:p>
+            <a:r>
+              <a:rPr lang="en-US" dirty="0" smtClean="0"/>
+              <a:t>How about the association?</a:t>
+            </a:r>
+            <a:endParaRPr lang="en-US" dirty="0"/>
+          </a:p>
+        </p:txBody>
+      </p:sp>
+      <p:pic>
+        <p:nvPicPr>
+          <p:cNvPr id="3" name="Picture 2"/>
+          <p:cNvPicPr>
+            <a:picLocks noChangeAspect="1"/>
+          </p:cNvPicPr>
+          <p:nvPr/>
+        </p:nvPicPr>
+        <p:blipFill rotWithShape="1">
+          <a:blip r:embed="rId2"/>
+          <a:srcRect l="1549" r="-1549"/>
+          <a:stretch/>
+        </p:blipFill>
+        <p:spPr>
+          <a:xfrm>
+            <a:off x="628650" y="2621757"/>
+            <a:ext cx="6972300" cy="317500"/>
+          </a:xfrm>
+          <a:prstGeom prst="rect">
+            <a:avLst/>
+          </a:prstGeom>
+        </p:spPr>
+      </p:pic>
+      <p:pic>
+        <p:nvPicPr>
+          <p:cNvPr id="6" name="Picture 5"/>
+          <p:cNvPicPr>
+            <a:picLocks noChangeAspect="1"/>
+          </p:cNvPicPr>
+          <p:nvPr/>
+        </p:nvPicPr>
+        <p:blipFill rotWithShape="1">
+          <a:blip r:embed="rId3"/>
+          <a:srcRect l="911" r="-911"/>
+          <a:stretch/>
+        </p:blipFill>
+        <p:spPr>
+          <a:xfrm>
+            <a:off x="628650" y="3560762"/>
+            <a:ext cx="7899400" cy="1320800"/>
+          </a:xfrm>
+          <a:prstGeom prst="rect">
+            <a:avLst/>
+          </a:prstGeom>
+        </p:spPr>
+      </p:pic>
+      <p:pic>
+        <p:nvPicPr>
+          <p:cNvPr id="8" name="Picture 7"/>
+          <p:cNvPicPr>
+            <a:picLocks noChangeAspect="1"/>
+          </p:cNvPicPr>
+          <p:nvPr/>
+        </p:nvPicPr>
+        <p:blipFill rotWithShape="1">
+          <a:blip r:embed="rId4"/>
+          <a:srcRect l="910" r="-910"/>
+          <a:stretch/>
+        </p:blipFill>
+        <p:spPr>
+          <a:xfrm>
+            <a:off x="628650" y="1296194"/>
+            <a:ext cx="7912100" cy="1333500"/>
+          </a:xfrm>
+          <a:prstGeom prst="rect">
+            <a:avLst/>
+          </a:prstGeom>
+        </p:spPr>
+      </p:pic>
+      <p:pic>
+        <p:nvPicPr>
+          <p:cNvPr id="9" name="Picture 8"/>
+          <p:cNvPicPr>
+            <a:picLocks noChangeAspect="1"/>
+          </p:cNvPicPr>
+          <p:nvPr/>
+        </p:nvPicPr>
+        <p:blipFill rotWithShape="1">
+          <a:blip r:embed="rId5"/>
+          <a:srcRect l="1074" r="-1074"/>
+          <a:stretch/>
+        </p:blipFill>
+        <p:spPr>
+          <a:xfrm>
+            <a:off x="628650" y="5009572"/>
+            <a:ext cx="6705600" cy="1549400"/>
+          </a:xfrm>
+          <a:prstGeom prst="rect">
+            <a:avLst/>
+          </a:prstGeom>
+        </p:spPr>
+      </p:pic>
+      <p:sp>
+        <p:nvSpPr>
+          <p:cNvPr id="10" name="Down Arrow 9"/>
+          <p:cNvSpPr/>
+          <p:nvPr/>
+        </p:nvSpPr>
+        <p:spPr>
+          <a:xfrm>
+            <a:off x="4343400" y="2939257"/>
+            <a:ext cx="457200" cy="489743"/>
+          </a:xfrm>
+          <a:prstGeom prst="downArrow">
+            <a:avLst/>
+          </a:prstGeom>
+        </p:spPr>
+        <p:style>
+          <a:lnRef idx="2">
+            <a:schemeClr val="accent1">
+              <a:shade val="50000"/>
+            </a:schemeClr>
+          </a:lnRef>
+          <a:fillRef idx="1">
+            <a:schemeClr val="accent1"/>
+          </a:fillRef>
+          <a:effectRef idx="0">
+            <a:schemeClr val="accent1"/>
+          </a:effectRef>
+          <a:fontRef idx="minor">
+            <a:schemeClr val="lt1"/>
+          </a:fontRef>
+        </p:style>
+        <p:txBody>
+          <a:bodyPr rtlCol="0" anchor="ctr"/>
+          <a:lstStyle/>
+          <a:p>
+            <a:pPr algn="ctr"/>
+            <a:endParaRPr lang="en-US"/>
+          </a:p>
+        </p:txBody>
+      </p:sp>
+    </p:spTree>
+    <p:extLst>
+      <p:ext uri="{BB962C8B-B14F-4D97-AF65-F5344CB8AC3E}">
+        <p14:creationId xmlns:p14="http://schemas.microsoft.com/office/powerpoint/2010/main" val="530143940"/>
+      </p:ext>
+    </p:extLst>
+  </p:cSld>
+  <p:clrMapOvr>
+    <a:masterClrMapping/>
+  </p:clrMapOvr>
+</p:sld>
+</file>
+
 <file path=ppt/theme/theme1.xml><?xml version="1.0" encoding="utf-8"?>
 <a:theme xmlns:a="http://schemas.openxmlformats.org/drawingml/2006/main" name="Office Theme">
   <a:themeElements>

</xml_diff>

<commit_message>
Commit at version 1.3
</commit_message>
<xml_diff>
--- a/src/main/resources/01 Generics and more.pptx
+++ b/src/main/resources/01 Generics and more.pptx
@@ -10,6 +10,8 @@
     <p:sldId id="258" r:id="rId4"/>
     <p:sldId id="259" r:id="rId5"/>
     <p:sldId id="260" r:id="rId6"/>
+    <p:sldId id="261" r:id="rId7"/>
+    <p:sldId id="262" r:id="rId8"/>
   </p:sldIdLst>
   <p:sldSz cx="9144000" cy="6858000" type="screen4x3"/>
   <p:notesSz cx="6858000" cy="9144000"/>
@@ -3111,6 +3113,13 @@
   <p:clrMapOvr>
     <a:masterClrMapping/>
   </p:clrMapOvr>
+  <p:timing>
+    <p:tnLst>
+      <p:par>
+        <p:cTn id="1" dur="indefinite" restart="never" nodeType="tmRoot"/>
+      </p:par>
+    </p:tnLst>
+  </p:timing>
 </p:sld>
 </file>
 
@@ -3194,6 +3203,13 @@
   <p:clrMapOvr>
     <a:masterClrMapping/>
   </p:clrMapOvr>
+  <p:timing>
+    <p:tnLst>
+      <p:par>
+        <p:cTn id="1" dur="indefinite" restart="never" nodeType="tmRoot"/>
+      </p:par>
+    </p:tnLst>
+  </p:timing>
 </p:sld>
 </file>
 
@@ -3271,6 +3287,13 @@
   <p:clrMapOvr>
     <a:masterClrMapping/>
   </p:clrMapOvr>
+  <p:timing>
+    <p:tnLst>
+      <p:par>
+        <p:cTn id="1" dur="indefinite" restart="never" nodeType="tmRoot"/>
+      </p:par>
+    </p:tnLst>
+  </p:timing>
 </p:sld>
 </file>
 
@@ -3348,6 +3371,13 @@
   <p:clrMapOvr>
     <a:masterClrMapping/>
   </p:clrMapOvr>
+  <p:timing>
+    <p:tnLst>
+      <p:par>
+        <p:cTn id="1" dur="indefinite" restart="never" nodeType="tmRoot"/>
+      </p:par>
+    </p:tnLst>
+  </p:timing>
 </p:sld>
 </file>
 
@@ -3533,6 +3563,344 @@
   <p:clrMapOvr>
     <a:masterClrMapping/>
   </p:clrMapOvr>
+  <p:timing>
+    <p:tnLst>
+      <p:par>
+        <p:cTn id="1" dur="indefinite" restart="never" nodeType="tmRoot"/>
+      </p:par>
+    </p:tnLst>
+  </p:timing>
+</p:sld>
+</file>
+
+<file path=ppt/slides/slide6.xml><?xml version="1.0" encoding="utf-8"?>
+<p:sld xmlns:a="http://schemas.openxmlformats.org/drawingml/2006/main" xmlns:r="http://schemas.openxmlformats.org/officeDocument/2006/relationships" xmlns:p="http://schemas.openxmlformats.org/presentationml/2006/main">
+  <p:cSld>
+    <p:spTree>
+      <p:nvGrpSpPr>
+        <p:cNvPr id="1" name=""/>
+        <p:cNvGrpSpPr/>
+        <p:nvPr/>
+      </p:nvGrpSpPr>
+      <p:grpSpPr>
+        <a:xfrm>
+          <a:off x="0" y="0"/>
+          <a:ext cx="0" cy="0"/>
+          <a:chOff x="0" y="0"/>
+          <a:chExt cx="0" cy="0"/>
+        </a:xfrm>
+      </p:grpSpPr>
+      <p:sp>
+        <p:nvSpPr>
+          <p:cNvPr id="2" name="Title 1"/>
+          <p:cNvSpPr>
+            <a:spLocks noGrp="1"/>
+          </p:cNvSpPr>
+          <p:nvPr>
+            <p:ph type="title"/>
+          </p:nvPr>
+        </p:nvSpPr>
+        <p:spPr/>
+        <p:txBody>
+          <a:bodyPr/>
+          <a:lstStyle/>
+          <a:p>
+            <a:r>
+              <a:rPr lang="en-US" dirty="0" smtClean="0"/>
+              <a:t>Let’s try to use the collection</a:t>
+            </a:r>
+            <a:endParaRPr lang="en-US" dirty="0"/>
+          </a:p>
+        </p:txBody>
+      </p:sp>
+      <p:pic>
+        <p:nvPicPr>
+          <p:cNvPr id="3" name="Picture 2"/>
+          <p:cNvPicPr>
+            <a:picLocks noChangeAspect="1"/>
+          </p:cNvPicPr>
+          <p:nvPr/>
+        </p:nvPicPr>
+        <p:blipFill rotWithShape="1">
+          <a:blip r:embed="rId2"/>
+          <a:srcRect l="1306" r="-1306"/>
+          <a:stretch/>
+        </p:blipFill>
+        <p:spPr>
+          <a:xfrm>
+            <a:off x="628650" y="1489211"/>
+            <a:ext cx="5511800" cy="2857500"/>
+          </a:xfrm>
+          <a:prstGeom prst="rect">
+            <a:avLst/>
+          </a:prstGeom>
+        </p:spPr>
+      </p:pic>
+      <p:grpSp>
+        <p:nvGrpSpPr>
+          <p:cNvPr id="6" name="Group 5"/>
+          <p:cNvGrpSpPr/>
+          <p:nvPr/>
+        </p:nvGrpSpPr>
+        <p:grpSpPr>
+          <a:xfrm>
+            <a:off x="877833" y="3428999"/>
+            <a:ext cx="6660157" cy="2243275"/>
+            <a:chOff x="877833" y="3428999"/>
+            <a:chExt cx="6660157" cy="2243275"/>
+          </a:xfrm>
+        </p:grpSpPr>
+        <p:sp>
+          <p:nvSpPr>
+            <p:cNvPr id="4" name="TextBox 3"/>
+            <p:cNvSpPr txBox="1"/>
+            <p:nvPr/>
+          </p:nvSpPr>
+          <p:spPr>
+            <a:xfrm>
+              <a:off x="877833" y="5149054"/>
+              <a:ext cx="6660157" cy="523220"/>
+            </a:xfrm>
+            <a:prstGeom prst="rect">
+              <a:avLst/>
+            </a:prstGeom>
+            <a:noFill/>
+          </p:spPr>
+          <p:txBody>
+            <a:bodyPr wrap="none" rtlCol="0">
+              <a:spAutoFit/>
+            </a:bodyPr>
+            <a:lstStyle/>
+            <a:p>
+              <a:r>
+                <a:rPr lang="en-US" sz="2800" dirty="0" smtClean="0"/>
+                <a:t>What if someone by accident hired a Pet </a:t>
+              </a:r>
+              <a:r>
+                <a:rPr lang="is-IS" sz="2800" dirty="0" smtClean="0"/>
+                <a:t>…?</a:t>
+              </a:r>
+              <a:endParaRPr lang="en-US" sz="2800" dirty="0"/>
+            </a:p>
+          </p:txBody>
+        </p:sp>
+        <p:sp>
+          <p:nvSpPr>
+            <p:cNvPr id="5" name="Up Arrow 4"/>
+            <p:cNvSpPr/>
+            <p:nvPr/>
+          </p:nvSpPr>
+          <p:spPr>
+            <a:xfrm>
+              <a:off x="3578772" y="3428999"/>
+              <a:ext cx="394138" cy="1836683"/>
+            </a:xfrm>
+            <a:prstGeom prst="upArrow">
+              <a:avLst/>
+            </a:prstGeom>
+            <a:solidFill>
+              <a:schemeClr val="accent1">
+                <a:alpha val="46000"/>
+              </a:schemeClr>
+            </a:solidFill>
+            <a:ln>
+              <a:noFill/>
+            </a:ln>
+          </p:spPr>
+          <p:style>
+            <a:lnRef idx="2">
+              <a:schemeClr val="accent1">
+                <a:shade val="50000"/>
+              </a:schemeClr>
+            </a:lnRef>
+            <a:fillRef idx="1">
+              <a:schemeClr val="accent1"/>
+            </a:fillRef>
+            <a:effectRef idx="0">
+              <a:schemeClr val="accent1"/>
+            </a:effectRef>
+            <a:fontRef idx="minor">
+              <a:schemeClr val="lt1"/>
+            </a:fontRef>
+          </p:style>
+          <p:txBody>
+            <a:bodyPr rtlCol="0" anchor="ctr"/>
+            <a:lstStyle/>
+            <a:p>
+              <a:pPr algn="ctr"/>
+              <a:endParaRPr lang="en-US"/>
+            </a:p>
+          </p:txBody>
+        </p:sp>
+      </p:grpSp>
+    </p:spTree>
+    <p:extLst>
+      <p:ext uri="{BB962C8B-B14F-4D97-AF65-F5344CB8AC3E}">
+        <p14:creationId xmlns:p14="http://schemas.microsoft.com/office/powerpoint/2010/main" val="1881615681"/>
+      </p:ext>
+    </p:extLst>
+  </p:cSld>
+  <p:clrMapOvr>
+    <a:masterClrMapping/>
+  </p:clrMapOvr>
+  <p:timing>
+    <p:tnLst>
+      <p:par>
+        <p:cTn id="1" dur="indefinite" restart="never" nodeType="tmRoot">
+          <p:childTnLst>
+            <p:seq concurrent="1" nextAc="seek">
+              <p:cTn id="2" dur="indefinite" nodeType="mainSeq">
+                <p:childTnLst>
+                  <p:par>
+                    <p:cTn id="3" fill="hold">
+                      <p:stCondLst>
+                        <p:cond delay="indefinite"/>
+                      </p:stCondLst>
+                      <p:childTnLst>
+                        <p:par>
+                          <p:cTn id="4" fill="hold">
+                            <p:stCondLst>
+                              <p:cond delay="0"/>
+                            </p:stCondLst>
+                            <p:childTnLst>
+                              <p:par>
+                                <p:cTn id="5" presetID="1" presetClass="entr" presetSubtype="0" fill="hold" nodeType="clickEffect">
+                                  <p:stCondLst>
+                                    <p:cond delay="0"/>
+                                  </p:stCondLst>
+                                  <p:childTnLst>
+                                    <p:set>
+                                      <p:cBhvr>
+                                        <p:cTn id="6" dur="1" fill="hold">
+                                          <p:stCondLst>
+                                            <p:cond delay="0"/>
+                                          </p:stCondLst>
+                                        </p:cTn>
+                                        <p:tgtEl>
+                                          <p:spTgt spid="6"/>
+                                        </p:tgtEl>
+                                        <p:attrNameLst>
+                                          <p:attrName>style.visibility</p:attrName>
+                                        </p:attrNameLst>
+                                      </p:cBhvr>
+                                      <p:to>
+                                        <p:strVal val="visible"/>
+                                      </p:to>
+                                    </p:set>
+                                  </p:childTnLst>
+                                </p:cTn>
+                              </p:par>
+                            </p:childTnLst>
+                          </p:cTn>
+                        </p:par>
+                      </p:childTnLst>
+                    </p:cTn>
+                  </p:par>
+                </p:childTnLst>
+              </p:cTn>
+              <p:prevCondLst>
+                <p:cond evt="onPrev" delay="0">
+                  <p:tgtEl>
+                    <p:sldTgt/>
+                  </p:tgtEl>
+                </p:cond>
+              </p:prevCondLst>
+              <p:nextCondLst>
+                <p:cond evt="onNext" delay="0">
+                  <p:tgtEl>
+                    <p:sldTgt/>
+                  </p:tgtEl>
+                </p:cond>
+              </p:nextCondLst>
+            </p:seq>
+          </p:childTnLst>
+        </p:cTn>
+      </p:par>
+    </p:tnLst>
+  </p:timing>
+</p:sld>
+</file>
+
+<file path=ppt/slides/slide7.xml><?xml version="1.0" encoding="utf-8"?>
+<p:sld xmlns:a="http://schemas.openxmlformats.org/drawingml/2006/main" xmlns:r="http://schemas.openxmlformats.org/officeDocument/2006/relationships" xmlns:p="http://schemas.openxmlformats.org/presentationml/2006/main">
+  <p:cSld>
+    <p:spTree>
+      <p:nvGrpSpPr>
+        <p:cNvPr id="1" name=""/>
+        <p:cNvGrpSpPr/>
+        <p:nvPr/>
+      </p:nvGrpSpPr>
+      <p:grpSpPr>
+        <a:xfrm>
+          <a:off x="0" y="0"/>
+          <a:ext cx="0" cy="0"/>
+          <a:chOff x="0" y="0"/>
+          <a:chExt cx="0" cy="0"/>
+        </a:xfrm>
+      </p:grpSpPr>
+      <p:sp>
+        <p:nvSpPr>
+          <p:cNvPr id="2" name="Title 1"/>
+          <p:cNvSpPr>
+            <a:spLocks noGrp="1"/>
+          </p:cNvSpPr>
+          <p:nvPr>
+            <p:ph type="title"/>
+          </p:nvPr>
+        </p:nvSpPr>
+        <p:spPr/>
+        <p:txBody>
+          <a:bodyPr/>
+          <a:lstStyle/>
+          <a:p>
+            <a:r>
+              <a:rPr lang="en-US" dirty="0" smtClean="0"/>
+              <a:t>Encapsulation never hurts </a:t>
+            </a:r>
+            <a:endParaRPr lang="en-US" dirty="0"/>
+          </a:p>
+        </p:txBody>
+      </p:sp>
+      <p:pic>
+        <p:nvPicPr>
+          <p:cNvPr id="4" name="Picture 3"/>
+          <p:cNvPicPr>
+            <a:picLocks noChangeAspect="1"/>
+          </p:cNvPicPr>
+          <p:nvPr/>
+        </p:nvPicPr>
+        <p:blipFill rotWithShape="1">
+          <a:blip r:embed="rId2"/>
+          <a:srcRect l="1541" r="-1541"/>
+          <a:stretch/>
+        </p:blipFill>
+        <p:spPr>
+          <a:xfrm>
+            <a:off x="628650" y="1489211"/>
+            <a:ext cx="4673600" cy="4394200"/>
+          </a:xfrm>
+          <a:prstGeom prst="rect">
+            <a:avLst/>
+          </a:prstGeom>
+        </p:spPr>
+      </p:pic>
+    </p:spTree>
+    <p:extLst>
+      <p:ext uri="{BB962C8B-B14F-4D97-AF65-F5344CB8AC3E}">
+        <p14:creationId xmlns:p14="http://schemas.microsoft.com/office/powerpoint/2010/main" val="1661296762"/>
+      </p:ext>
+    </p:extLst>
+  </p:cSld>
+  <p:clrMapOvr>
+    <a:masterClrMapping/>
+  </p:clrMapOvr>
+  <p:timing>
+    <p:tnLst>
+      <p:par>
+        <p:cTn id="1" dur="indefinite" restart="never" nodeType="tmRoot"/>
+      </p:par>
+    </p:tnLst>
+  </p:timing>
 </p:sld>
 </file>
 

</xml_diff>